<commit_message>
updated code and slide deck
</commit_message>
<xml_diff>
--- a/slide_deck_template.pptx
+++ b/slide_deck_template.pptx
@@ -278,7 +278,7 @@
           <a:p>
             <a:fld id="{4E125AEB-FB78-D14A-825E-51BD78A5AD6F}" type="datetimeFigureOut">
               <a:rPr lang="en-US" smtClean="0"/>
-              <a:t>1/14/24</a:t>
+              <a:t>1/15/24</a:t>
             </a:fld>
             <a:endParaRPr lang="en-US"/>
           </a:p>
@@ -448,7 +448,7 @@
           <a:p>
             <a:fld id="{4E125AEB-FB78-D14A-825E-51BD78A5AD6F}" type="datetimeFigureOut">
               <a:rPr lang="en-US" smtClean="0"/>
-              <a:t>1/14/24</a:t>
+              <a:t>1/15/24</a:t>
             </a:fld>
             <a:endParaRPr lang="en-US"/>
           </a:p>
@@ -628,7 +628,7 @@
           <a:p>
             <a:fld id="{4E125AEB-FB78-D14A-825E-51BD78A5AD6F}" type="datetimeFigureOut">
               <a:rPr lang="en-US" smtClean="0"/>
-              <a:t>1/14/24</a:t>
+              <a:t>1/15/24</a:t>
             </a:fld>
             <a:endParaRPr lang="en-US"/>
           </a:p>
@@ -798,7 +798,7 @@
           <a:p>
             <a:fld id="{4E125AEB-FB78-D14A-825E-51BD78A5AD6F}" type="datetimeFigureOut">
               <a:rPr lang="en-US" smtClean="0"/>
-              <a:t>1/14/24</a:t>
+              <a:t>1/15/24</a:t>
             </a:fld>
             <a:endParaRPr lang="en-US"/>
           </a:p>
@@ -1058,7 +1058,7 @@
           <a:p>
             <a:fld id="{4E125AEB-FB78-D14A-825E-51BD78A5AD6F}" type="datetimeFigureOut">
               <a:rPr lang="en-US" smtClean="0"/>
-              <a:t>1/14/24</a:t>
+              <a:t>1/15/24</a:t>
             </a:fld>
             <a:endParaRPr lang="en-US"/>
           </a:p>
@@ -1290,7 +1290,7 @@
           <a:p>
             <a:fld id="{4E125AEB-FB78-D14A-825E-51BD78A5AD6F}" type="datetimeFigureOut">
               <a:rPr lang="en-US" smtClean="0"/>
-              <a:t>1/14/24</a:t>
+              <a:t>1/15/24</a:t>
             </a:fld>
             <a:endParaRPr lang="en-US"/>
           </a:p>
@@ -1645,7 +1645,7 @@
           <a:p>
             <a:fld id="{4E125AEB-FB78-D14A-825E-51BD78A5AD6F}" type="datetimeFigureOut">
               <a:rPr lang="en-US" smtClean="0"/>
-              <a:t>1/14/24</a:t>
+              <a:t>1/15/24</a:t>
             </a:fld>
             <a:endParaRPr lang="en-US"/>
           </a:p>
@@ -1786,7 +1786,7 @@
           <a:p>
             <a:fld id="{4E125AEB-FB78-D14A-825E-51BD78A5AD6F}" type="datetimeFigureOut">
               <a:rPr lang="en-US" smtClean="0"/>
-              <a:t>1/14/24</a:t>
+              <a:t>1/15/24</a:t>
             </a:fld>
             <a:endParaRPr lang="en-US"/>
           </a:p>
@@ -1881,7 +1881,7 @@
           <a:p>
             <a:fld id="{4E125AEB-FB78-D14A-825E-51BD78A5AD6F}" type="datetimeFigureOut">
               <a:rPr lang="en-US" smtClean="0"/>
-              <a:t>1/14/24</a:t>
+              <a:t>1/15/24</a:t>
             </a:fld>
             <a:endParaRPr lang="en-US"/>
           </a:p>
@@ -2238,7 +2238,7 @@
           <a:p>
             <a:fld id="{4E125AEB-FB78-D14A-825E-51BD78A5AD6F}" type="datetimeFigureOut">
               <a:rPr lang="en-US" smtClean="0"/>
-              <a:t>1/14/24</a:t>
+              <a:t>1/15/24</a:t>
             </a:fld>
             <a:endParaRPr lang="en-US"/>
           </a:p>
@@ -2556,7 +2556,7 @@
           <a:p>
             <a:fld id="{4E125AEB-FB78-D14A-825E-51BD78A5AD6F}" type="datetimeFigureOut">
               <a:rPr lang="en-US" smtClean="0"/>
-              <a:t>1/14/24</a:t>
+              <a:t>1/15/24</a:t>
             </a:fld>
             <a:endParaRPr lang="en-US"/>
           </a:p>
@@ -2801,7 +2801,7 @@
           <a:p>
             <a:fld id="{4E125AEB-FB78-D14A-825E-51BD78A5AD6F}" type="datetimeFigureOut">
               <a:rPr lang="en-US" smtClean="0"/>
-              <a:t>1/14/24</a:t>
+              <a:t>1/15/24</a:t>
             </a:fld>
             <a:endParaRPr lang="en-US"/>
           </a:p>
@@ -4403,7 +4403,7 @@
         </p:blipFill>
         <p:spPr>
           <a:xfrm>
-            <a:off x="215117" y="3703356"/>
+            <a:off x="215117" y="3277597"/>
             <a:ext cx="8606621" cy="2646695"/>
           </a:xfrm>
           <a:prstGeom prst="rect">
@@ -4425,7 +4425,7 @@
         </p:nvSpPr>
         <p:spPr>
           <a:xfrm>
-            <a:off x="1004888" y="1569438"/>
+            <a:off x="1004888" y="1736150"/>
             <a:ext cx="7598664" cy="1200329"/>
           </a:xfrm>
           <a:prstGeom prst="rect">

</xml_diff>